<commit_message>
Avance Estudiantes 26.10.2023 - 21:38pm
</commit_message>
<xml_diff>
--- a/00-Archivos-Generales/Información Importante 19.10.2023.pptx
+++ b/00-Archivos-Generales/Información Importante 19.10.2023.pptx
@@ -5304,7 +5304,7 @@
           <a:p>
             <a:fld id="{8642F6C5-A63A-42BD-8575-E3BC7A08BE61}" type="datetimeFigureOut">
               <a:rPr lang="es-419" smtClean="0"/>
-              <a:t>19/10/2023</a:t>
+              <a:t>26/10/2023</a:t>
             </a:fld>
             <a:endParaRPr lang="es-419"/>
           </a:p>
@@ -5474,7 +5474,7 @@
           <a:p>
             <a:fld id="{8642F6C5-A63A-42BD-8575-E3BC7A08BE61}" type="datetimeFigureOut">
               <a:rPr lang="es-419" smtClean="0"/>
-              <a:t>19/10/2023</a:t>
+              <a:t>26/10/2023</a:t>
             </a:fld>
             <a:endParaRPr lang="es-419"/>
           </a:p>
@@ -5654,7 +5654,7 @@
           <a:p>
             <a:fld id="{8642F6C5-A63A-42BD-8575-E3BC7A08BE61}" type="datetimeFigureOut">
               <a:rPr lang="es-419" smtClean="0"/>
-              <a:t>19/10/2023</a:t>
+              <a:t>26/10/2023</a:t>
             </a:fld>
             <a:endParaRPr lang="es-419"/>
           </a:p>
@@ -5824,7 +5824,7 @@
           <a:p>
             <a:fld id="{8642F6C5-A63A-42BD-8575-E3BC7A08BE61}" type="datetimeFigureOut">
               <a:rPr lang="es-419" smtClean="0"/>
-              <a:t>19/10/2023</a:t>
+              <a:t>26/10/2023</a:t>
             </a:fld>
             <a:endParaRPr lang="es-419"/>
           </a:p>
@@ -6068,7 +6068,7 @@
           <a:p>
             <a:fld id="{8642F6C5-A63A-42BD-8575-E3BC7A08BE61}" type="datetimeFigureOut">
               <a:rPr lang="es-419" smtClean="0"/>
-              <a:t>19/10/2023</a:t>
+              <a:t>26/10/2023</a:t>
             </a:fld>
             <a:endParaRPr lang="es-419"/>
           </a:p>
@@ -6300,7 +6300,7 @@
           <a:p>
             <a:fld id="{8642F6C5-A63A-42BD-8575-E3BC7A08BE61}" type="datetimeFigureOut">
               <a:rPr lang="es-419" smtClean="0"/>
-              <a:t>19/10/2023</a:t>
+              <a:t>26/10/2023</a:t>
             </a:fld>
             <a:endParaRPr lang="es-419"/>
           </a:p>
@@ -6667,7 +6667,7 @@
           <a:p>
             <a:fld id="{8642F6C5-A63A-42BD-8575-E3BC7A08BE61}" type="datetimeFigureOut">
               <a:rPr lang="es-419" smtClean="0"/>
-              <a:t>19/10/2023</a:t>
+              <a:t>26/10/2023</a:t>
             </a:fld>
             <a:endParaRPr lang="es-419"/>
           </a:p>
@@ -6785,7 +6785,7 @@
           <a:p>
             <a:fld id="{8642F6C5-A63A-42BD-8575-E3BC7A08BE61}" type="datetimeFigureOut">
               <a:rPr lang="es-419" smtClean="0"/>
-              <a:t>19/10/2023</a:t>
+              <a:t>26/10/2023</a:t>
             </a:fld>
             <a:endParaRPr lang="es-419"/>
           </a:p>
@@ -6880,7 +6880,7 @@
           <a:p>
             <a:fld id="{8642F6C5-A63A-42BD-8575-E3BC7A08BE61}" type="datetimeFigureOut">
               <a:rPr lang="es-419" smtClean="0"/>
-              <a:t>19/10/2023</a:t>
+              <a:t>26/10/2023</a:t>
             </a:fld>
             <a:endParaRPr lang="es-419"/>
           </a:p>
@@ -7157,7 +7157,7 @@
           <a:p>
             <a:fld id="{8642F6C5-A63A-42BD-8575-E3BC7A08BE61}" type="datetimeFigureOut">
               <a:rPr lang="es-419" smtClean="0"/>
-              <a:t>19/10/2023</a:t>
+              <a:t>26/10/2023</a:t>
             </a:fld>
             <a:endParaRPr lang="es-419"/>
           </a:p>
@@ -7414,7 +7414,7 @@
           <a:p>
             <a:fld id="{8642F6C5-A63A-42BD-8575-E3BC7A08BE61}" type="datetimeFigureOut">
               <a:rPr lang="es-419" smtClean="0"/>
-              <a:t>19/10/2023</a:t>
+              <a:t>26/10/2023</a:t>
             </a:fld>
             <a:endParaRPr lang="es-419"/>
           </a:p>
@@ -7627,7 +7627,7 @@
           <a:p>
             <a:fld id="{8642F6C5-A63A-42BD-8575-E3BC7A08BE61}" type="datetimeFigureOut">
               <a:rPr lang="es-419" smtClean="0"/>
-              <a:t>19/10/2023</a:t>
+              <a:t>26/10/2023</a:t>
             </a:fld>
             <a:endParaRPr lang="es-419"/>
           </a:p>
@@ -18036,13 +18036,16 @@
           <a:lstStyle/>
           <a:p>
             <a:pPr algn="ctr"/>
-            <a:endParaRPr lang="es-419" sz="5000" dirty="0">
-              <a:solidFill>
-                <a:srgbClr val="66FF33"/>
-              </a:solidFill>
-              <a:latin typeface="Arial" panose="020B0604020202020204" pitchFamily="34" charset="0"/>
-              <a:cs typeface="Arial" panose="020B0604020202020204" pitchFamily="34" charset="0"/>
-            </a:endParaRPr>
+            <a:r>
+              <a:rPr lang="es-419" sz="5000" dirty="0">
+                <a:solidFill>
+                  <a:srgbClr val="66FF33"/>
+                </a:solidFill>
+                <a:latin typeface="Arial" panose="020B0604020202020204" pitchFamily="34" charset="0"/>
+                <a:cs typeface="Arial" panose="020B0604020202020204" pitchFamily="34" charset="0"/>
+              </a:rPr>
+              <a:t>Valentina y Ana Paula</a:t>
+            </a:r>
           </a:p>
         </p:txBody>
       </p:sp>

</xml_diff>